<commit_message>
remove table from results-view in rst, png, pptx
</commit_message>
<xml_diff>
--- a/Specifications/swept-oae/GUI-Screens.pptx
+++ b/Specifications/swept-oae/GUI-Screens.pptx
@@ -261,7 +261,7 @@
           <a:p>
             <a:fld id="{6E783203-F72E-42D3-9F56-E7123AD26E23}" type="datetimeFigureOut">
               <a:rPr lang="en-US" smtClean="0"/>
-              <a:t>11/14/2024</a:t>
+              <a:t>11/15/2024</a:t>
             </a:fld>
             <a:endParaRPr lang="en-US"/>
           </a:p>
@@ -459,7 +459,7 @@
           <a:p>
             <a:fld id="{6E783203-F72E-42D3-9F56-E7123AD26E23}" type="datetimeFigureOut">
               <a:rPr lang="en-US" smtClean="0"/>
-              <a:t>11/14/2024</a:t>
+              <a:t>11/15/2024</a:t>
             </a:fld>
             <a:endParaRPr lang="en-US"/>
           </a:p>
@@ -667,7 +667,7 @@
           <a:p>
             <a:fld id="{6E783203-F72E-42D3-9F56-E7123AD26E23}" type="datetimeFigureOut">
               <a:rPr lang="en-US" smtClean="0"/>
-              <a:t>11/14/2024</a:t>
+              <a:t>11/15/2024</a:t>
             </a:fld>
             <a:endParaRPr lang="en-US"/>
           </a:p>
@@ -865,7 +865,7 @@
           <a:p>
             <a:fld id="{6E783203-F72E-42D3-9F56-E7123AD26E23}" type="datetimeFigureOut">
               <a:rPr lang="en-US" smtClean="0"/>
-              <a:t>11/14/2024</a:t>
+              <a:t>11/15/2024</a:t>
             </a:fld>
             <a:endParaRPr lang="en-US"/>
           </a:p>
@@ -1140,7 +1140,7 @@
           <a:p>
             <a:fld id="{6E783203-F72E-42D3-9F56-E7123AD26E23}" type="datetimeFigureOut">
               <a:rPr lang="en-US" smtClean="0"/>
-              <a:t>11/14/2024</a:t>
+              <a:t>11/15/2024</a:t>
             </a:fld>
             <a:endParaRPr lang="en-US"/>
           </a:p>
@@ -1405,7 +1405,7 @@
           <a:p>
             <a:fld id="{6E783203-F72E-42D3-9F56-E7123AD26E23}" type="datetimeFigureOut">
               <a:rPr lang="en-US" smtClean="0"/>
-              <a:t>11/14/2024</a:t>
+              <a:t>11/15/2024</a:t>
             </a:fld>
             <a:endParaRPr lang="en-US"/>
           </a:p>
@@ -1817,7 +1817,7 @@
           <a:p>
             <a:fld id="{6E783203-F72E-42D3-9F56-E7123AD26E23}" type="datetimeFigureOut">
               <a:rPr lang="en-US" smtClean="0"/>
-              <a:t>11/14/2024</a:t>
+              <a:t>11/15/2024</a:t>
             </a:fld>
             <a:endParaRPr lang="en-US"/>
           </a:p>
@@ -1958,7 +1958,7 @@
           <a:p>
             <a:fld id="{6E783203-F72E-42D3-9F56-E7123AD26E23}" type="datetimeFigureOut">
               <a:rPr lang="en-US" smtClean="0"/>
-              <a:t>11/14/2024</a:t>
+              <a:t>11/15/2024</a:t>
             </a:fld>
             <a:endParaRPr lang="en-US"/>
           </a:p>
@@ -2071,7 +2071,7 @@
           <a:p>
             <a:fld id="{6E783203-F72E-42D3-9F56-E7123AD26E23}" type="datetimeFigureOut">
               <a:rPr lang="en-US" smtClean="0"/>
-              <a:t>11/14/2024</a:t>
+              <a:t>11/15/2024</a:t>
             </a:fld>
             <a:endParaRPr lang="en-US"/>
           </a:p>
@@ -2382,7 +2382,7 @@
           <a:p>
             <a:fld id="{6E783203-F72E-42D3-9F56-E7123AD26E23}" type="datetimeFigureOut">
               <a:rPr lang="en-US" smtClean="0"/>
-              <a:t>11/14/2024</a:t>
+              <a:t>11/15/2024</a:t>
             </a:fld>
             <a:endParaRPr lang="en-US"/>
           </a:p>
@@ -2670,7 +2670,7 @@
           <a:p>
             <a:fld id="{6E783203-F72E-42D3-9F56-E7123AD26E23}" type="datetimeFigureOut">
               <a:rPr lang="en-US" smtClean="0"/>
-              <a:t>11/14/2024</a:t>
+              <a:t>11/15/2024</a:t>
             </a:fld>
             <a:endParaRPr lang="en-US"/>
           </a:p>
@@ -2911,7 +2911,7 @@
           <a:p>
             <a:fld id="{6E783203-F72E-42D3-9F56-E7123AD26E23}" type="datetimeFigureOut">
               <a:rPr lang="en-US" smtClean="0"/>
-              <a:t>11/14/2024</a:t>
+              <a:t>11/15/2024</a:t>
             </a:fld>
             <a:endParaRPr lang="en-US"/>
           </a:p>
@@ -6146,8 +6146,8 @@
         </p:blipFill>
         <p:spPr>
           <a:xfrm>
-            <a:off x="4042118" y="1119576"/>
-            <a:ext cx="3914029" cy="3001361"/>
+            <a:off x="3706766" y="1502943"/>
+            <a:ext cx="4670997" cy="3581820"/>
           </a:xfrm>
           <a:prstGeom prst="rect">
             <a:avLst/>
@@ -6157,476 +6157,6 @@
           </a:ln>
         </p:spPr>
       </p:pic>
-      <p:graphicFrame>
-        <p:nvGraphicFramePr>
-          <p:cNvPr id="16" name="Table 15">
-            <a:extLst>
-              <a:ext uri="{FF2B5EF4-FFF2-40B4-BE49-F238E27FC236}">
-                <a16:creationId xmlns:a16="http://schemas.microsoft.com/office/drawing/2014/main" id="{273497DE-AFFF-6FB5-51EB-77753806FF3A}"/>
-              </a:ext>
-            </a:extLst>
-          </p:cNvPr>
-          <p:cNvGraphicFramePr>
-            <a:graphicFrameLocks noGrp="1"/>
-          </p:cNvGraphicFramePr>
-          <p:nvPr>
-            <p:extLst>
-              <p:ext uri="{D42A27DB-BD31-4B8C-83A1-F6EECF244321}">
-                <p14:modId xmlns:p14="http://schemas.microsoft.com/office/powerpoint/2010/main" val="1752776000"/>
-              </p:ext>
-            </p:extLst>
-          </p:nvPr>
-        </p:nvGraphicFramePr>
-        <p:xfrm>
-          <a:off x="4734630" y="4317262"/>
-          <a:ext cx="2722737" cy="1371600"/>
-        </p:xfrm>
-        <a:graphic>
-          <a:graphicData uri="http://schemas.openxmlformats.org/drawingml/2006/table">
-            <a:tbl>
-              <a:tblPr firstRow="1" bandRow="1">
-                <a:tableStyleId>{5C22544A-7EE6-4342-B048-85BDC9FD1C3A}</a:tableStyleId>
-              </a:tblPr>
-              <a:tblGrid>
-                <a:gridCol w="883906">
-                  <a:extLst>
-                    <a:ext uri="{9D8B030D-6E8A-4147-A177-3AD203B41FA5}">
-                      <a16:colId xmlns:a16="http://schemas.microsoft.com/office/drawing/2014/main" val="2668354969"/>
-                    </a:ext>
-                  </a:extLst>
-                </a:gridCol>
-                <a:gridCol w="910170">
-                  <a:extLst>
-                    <a:ext uri="{9D8B030D-6E8A-4147-A177-3AD203B41FA5}">
-                      <a16:colId xmlns:a16="http://schemas.microsoft.com/office/drawing/2014/main" val="3965875387"/>
-                    </a:ext>
-                  </a:extLst>
-                </a:gridCol>
-                <a:gridCol w="928661">
-                  <a:extLst>
-                    <a:ext uri="{9D8B030D-6E8A-4147-A177-3AD203B41FA5}">
-                      <a16:colId xmlns:a16="http://schemas.microsoft.com/office/drawing/2014/main" val="554942825"/>
-                    </a:ext>
-                  </a:extLst>
-                </a:gridCol>
-              </a:tblGrid>
-              <a:tr h="128657">
-                <a:tc>
-                  <a:txBody>
-                    <a:bodyPr/>
-                    <a:lstStyle/>
-                    <a:p>
-                      <a:pPr algn="ctr"/>
-                      <a:r>
-                        <a:rPr lang="en-US" sz="1200" dirty="0">
-                          <a:solidFill>
-                            <a:schemeClr val="bg2">
-                              <a:lumMod val="25000"/>
-                            </a:schemeClr>
-                          </a:solidFill>
-                        </a:rPr>
-                        <a:t>Result</a:t>
-                      </a:r>
-                    </a:p>
-                  </a:txBody>
-                  <a:tcPr>
-                    <a:solidFill>
-                      <a:schemeClr val="bg1">
-                        <a:lumMod val="85000"/>
-                      </a:schemeClr>
-                    </a:solidFill>
-                  </a:tcPr>
-                </a:tc>
-                <a:tc>
-                  <a:txBody>
-                    <a:bodyPr/>
-                    <a:lstStyle/>
-                    <a:p>
-                      <a:pPr algn="ctr"/>
-                      <a:r>
-                        <a:rPr lang="en-US" sz="1200" dirty="0">
-                          <a:solidFill>
-                            <a:schemeClr val="bg2">
-                              <a:lumMod val="25000"/>
-                            </a:schemeClr>
-                          </a:solidFill>
-                        </a:rPr>
-                        <a:t>Value</a:t>
-                      </a:r>
-                    </a:p>
-                  </a:txBody>
-                  <a:tcPr>
-                    <a:solidFill>
-                      <a:schemeClr val="bg1">
-                        <a:lumMod val="85000"/>
-                      </a:schemeClr>
-                    </a:solidFill>
-                  </a:tcPr>
-                </a:tc>
-                <a:tc>
-                  <a:txBody>
-                    <a:bodyPr/>
-                    <a:lstStyle/>
-                    <a:p>
-                      <a:pPr algn="ctr"/>
-                      <a:r>
-                        <a:rPr lang="en-US" sz="1200" dirty="0">
-                          <a:solidFill>
-                            <a:schemeClr val="bg2">
-                              <a:lumMod val="25000"/>
-                            </a:schemeClr>
-                          </a:solidFill>
-                        </a:rPr>
-                        <a:t>Units</a:t>
-                      </a:r>
-                    </a:p>
-                  </a:txBody>
-                  <a:tcPr>
-                    <a:solidFill>
-                      <a:schemeClr val="bg1">
-                        <a:lumMod val="85000"/>
-                      </a:schemeClr>
-                    </a:solidFill>
-                  </a:tcPr>
-                </a:tc>
-                <a:extLst>
-                  <a:ext uri="{0D108BD9-81ED-4DB2-BD59-A6C34878D82A}">
-                    <a16:rowId xmlns:a16="http://schemas.microsoft.com/office/drawing/2014/main" val="2673981942"/>
-                  </a:ext>
-                </a:extLst>
-              </a:tr>
-              <a:tr h="128657">
-                <a:tc>
-                  <a:txBody>
-                    <a:bodyPr/>
-                    <a:lstStyle/>
-                    <a:p>
-                      <a:pPr algn="ctr"/>
-                      <a:r>
-                        <a:rPr lang="en-US" sz="1200" dirty="0">
-                          <a:solidFill>
-                            <a:schemeClr val="bg2">
-                              <a:lumMod val="25000"/>
-                            </a:schemeClr>
-                          </a:solidFill>
-                        </a:rPr>
-                        <a:t>DpLow</a:t>
-                      </a:r>
-                    </a:p>
-                  </a:txBody>
-                  <a:tcPr>
-                    <a:solidFill>
-                      <a:schemeClr val="bg1">
-                        <a:lumMod val="85000"/>
-                      </a:schemeClr>
-                    </a:solidFill>
-                  </a:tcPr>
-                </a:tc>
-                <a:tc>
-                  <a:txBody>
-                    <a:bodyPr/>
-                    <a:lstStyle/>
-                    <a:p>
-                      <a:pPr algn="ctr"/>
-                      <a:endParaRPr lang="en-US" sz="1200" dirty="0">
-                        <a:solidFill>
-                          <a:schemeClr val="bg2">
-                            <a:lumMod val="25000"/>
-                          </a:schemeClr>
-                        </a:solidFill>
-                      </a:endParaRPr>
-                    </a:p>
-                  </a:txBody>
-                  <a:tcPr>
-                    <a:solidFill>
-                      <a:schemeClr val="bg1">
-                        <a:lumMod val="85000"/>
-                      </a:schemeClr>
-                    </a:solidFill>
-                  </a:tcPr>
-                </a:tc>
-                <a:tc>
-                  <a:txBody>
-                    <a:bodyPr/>
-                    <a:lstStyle/>
-                    <a:p>
-                      <a:pPr algn="ctr"/>
-                      <a:r>
-                        <a:rPr lang="en-US" sz="1200" dirty="0">
-                          <a:solidFill>
-                            <a:schemeClr val="bg2">
-                              <a:lumMod val="25000"/>
-                            </a:schemeClr>
-                          </a:solidFill>
-                        </a:rPr>
-                        <a:t>dB SPL</a:t>
-                      </a:r>
-                    </a:p>
-                  </a:txBody>
-                  <a:tcPr>
-                    <a:solidFill>
-                      <a:schemeClr val="bg1">
-                        <a:lumMod val="85000"/>
-                      </a:schemeClr>
-                    </a:solidFill>
-                  </a:tcPr>
-                </a:tc>
-                <a:extLst>
-                  <a:ext uri="{0D108BD9-81ED-4DB2-BD59-A6C34878D82A}">
-                    <a16:rowId xmlns:a16="http://schemas.microsoft.com/office/drawing/2014/main" val="3684690503"/>
-                  </a:ext>
-                </a:extLst>
-              </a:tr>
-              <a:tr h="128657">
-                <a:tc>
-                  <a:txBody>
-                    <a:bodyPr/>
-                    <a:lstStyle/>
-                    <a:p>
-                      <a:pPr algn="ctr"/>
-                      <a:r>
-                        <a:rPr lang="en-US" sz="1200" dirty="0">
-                          <a:solidFill>
-                            <a:schemeClr val="bg2">
-                              <a:lumMod val="25000"/>
-                            </a:schemeClr>
-                          </a:solidFill>
-                        </a:rPr>
-                        <a:t>DpHigh</a:t>
-                      </a:r>
-                    </a:p>
-                  </a:txBody>
-                  <a:tcPr>
-                    <a:solidFill>
-                      <a:schemeClr val="bg1">
-                        <a:lumMod val="85000"/>
-                      </a:schemeClr>
-                    </a:solidFill>
-                  </a:tcPr>
-                </a:tc>
-                <a:tc>
-                  <a:txBody>
-                    <a:bodyPr/>
-                    <a:lstStyle/>
-                    <a:p>
-                      <a:pPr algn="ctr"/>
-                      <a:endParaRPr lang="en-US" sz="1200" dirty="0">
-                        <a:solidFill>
-                          <a:schemeClr val="bg2">
-                            <a:lumMod val="25000"/>
-                          </a:schemeClr>
-                        </a:solidFill>
-                      </a:endParaRPr>
-                    </a:p>
-                  </a:txBody>
-                  <a:tcPr>
-                    <a:solidFill>
-                      <a:schemeClr val="bg1">
-                        <a:lumMod val="85000"/>
-                      </a:schemeClr>
-                    </a:solidFill>
-                  </a:tcPr>
-                </a:tc>
-                <a:tc>
-                  <a:txBody>
-                    <a:bodyPr/>
-                    <a:lstStyle/>
-                    <a:p>
-                      <a:pPr algn="ctr"/>
-                      <a:r>
-                        <a:rPr lang="en-US" sz="1200" dirty="0">
-                          <a:solidFill>
-                            <a:schemeClr val="bg2">
-                              <a:lumMod val="25000"/>
-                            </a:schemeClr>
-                          </a:solidFill>
-                        </a:rPr>
-                        <a:t>dB SPL</a:t>
-                      </a:r>
-                    </a:p>
-                  </a:txBody>
-                  <a:tcPr>
-                    <a:solidFill>
-                      <a:schemeClr val="bg1">
-                        <a:lumMod val="85000"/>
-                      </a:schemeClr>
-                    </a:solidFill>
-                  </a:tcPr>
-                </a:tc>
-                <a:extLst>
-                  <a:ext uri="{0D108BD9-81ED-4DB2-BD59-A6C34878D82A}">
-                    <a16:rowId xmlns:a16="http://schemas.microsoft.com/office/drawing/2014/main" val="2297099642"/>
-                  </a:ext>
-                </a:extLst>
-              </a:tr>
-              <a:tr h="128657">
-                <a:tc>
-                  <a:txBody>
-                    <a:bodyPr/>
-                    <a:lstStyle/>
-                    <a:p>
-                      <a:pPr algn="ctr"/>
-                      <a:r>
-                        <a:rPr lang="en-US" sz="1200" dirty="0">
-                          <a:solidFill>
-                            <a:schemeClr val="bg2">
-                              <a:lumMod val="25000"/>
-                            </a:schemeClr>
-                          </a:solidFill>
-                        </a:rPr>
-                        <a:t>F1</a:t>
-                      </a:r>
-                    </a:p>
-                  </a:txBody>
-                  <a:tcPr>
-                    <a:solidFill>
-                      <a:schemeClr val="bg1">
-                        <a:lumMod val="85000"/>
-                      </a:schemeClr>
-                    </a:solidFill>
-                  </a:tcPr>
-                </a:tc>
-                <a:tc>
-                  <a:txBody>
-                    <a:bodyPr/>
-                    <a:lstStyle/>
-                    <a:p>
-                      <a:pPr algn="ctr"/>
-                      <a:endParaRPr lang="en-US" sz="1200" dirty="0">
-                        <a:solidFill>
-                          <a:schemeClr val="bg2">
-                            <a:lumMod val="25000"/>
-                          </a:schemeClr>
-                        </a:solidFill>
-                      </a:endParaRPr>
-                    </a:p>
-                  </a:txBody>
-                  <a:tcPr>
-                    <a:solidFill>
-                      <a:schemeClr val="bg1">
-                        <a:lumMod val="85000"/>
-                      </a:schemeClr>
-                    </a:solidFill>
-                  </a:tcPr>
-                </a:tc>
-                <a:tc>
-                  <a:txBody>
-                    <a:bodyPr/>
-                    <a:lstStyle/>
-                    <a:p>
-                      <a:pPr algn="ctr"/>
-                      <a:r>
-                        <a:rPr lang="en-US" sz="1200" dirty="0">
-                          <a:solidFill>
-                            <a:schemeClr val="bg2">
-                              <a:lumMod val="25000"/>
-                            </a:schemeClr>
-                          </a:solidFill>
-                        </a:rPr>
-                        <a:t>dB SPL</a:t>
-                      </a:r>
-                    </a:p>
-                  </a:txBody>
-                  <a:tcPr>
-                    <a:solidFill>
-                      <a:schemeClr val="bg1">
-                        <a:lumMod val="85000"/>
-                      </a:schemeClr>
-                    </a:solidFill>
-                  </a:tcPr>
-                </a:tc>
-                <a:extLst>
-                  <a:ext uri="{0D108BD9-81ED-4DB2-BD59-A6C34878D82A}">
-                    <a16:rowId xmlns:a16="http://schemas.microsoft.com/office/drawing/2014/main" val="3212293561"/>
-                  </a:ext>
-                </a:extLst>
-              </a:tr>
-              <a:tr h="128657">
-                <a:tc>
-                  <a:txBody>
-                    <a:bodyPr/>
-                    <a:lstStyle/>
-                    <a:p>
-                      <a:pPr algn="ctr"/>
-                      <a:r>
-                        <a:rPr lang="en-US" sz="1200" dirty="0">
-                          <a:solidFill>
-                            <a:schemeClr val="bg2">
-                              <a:lumMod val="25000"/>
-                            </a:schemeClr>
-                          </a:solidFill>
-                        </a:rPr>
-                        <a:t>F2</a:t>
-                      </a:r>
-                    </a:p>
-                  </a:txBody>
-                  <a:tcPr>
-                    <a:solidFill>
-                      <a:schemeClr val="bg1">
-                        <a:lumMod val="85000"/>
-                      </a:schemeClr>
-                    </a:solidFill>
-                  </a:tcPr>
-                </a:tc>
-                <a:tc>
-                  <a:txBody>
-                    <a:bodyPr/>
-                    <a:lstStyle/>
-                    <a:p>
-                      <a:pPr algn="ctr"/>
-                      <a:endParaRPr lang="en-US" sz="1200" dirty="0">
-                        <a:solidFill>
-                          <a:schemeClr val="bg2">
-                            <a:lumMod val="25000"/>
-                          </a:schemeClr>
-                        </a:solidFill>
-                      </a:endParaRPr>
-                    </a:p>
-                  </a:txBody>
-                  <a:tcPr>
-                    <a:solidFill>
-                      <a:schemeClr val="bg1">
-                        <a:lumMod val="85000"/>
-                      </a:schemeClr>
-                    </a:solidFill>
-                  </a:tcPr>
-                </a:tc>
-                <a:tc>
-                  <a:txBody>
-                    <a:bodyPr/>
-                    <a:lstStyle/>
-                    <a:p>
-                      <a:pPr algn="ctr"/>
-                      <a:r>
-                        <a:rPr lang="en-US" sz="1200" dirty="0">
-                          <a:solidFill>
-                            <a:schemeClr val="bg2">
-                              <a:lumMod val="25000"/>
-                            </a:schemeClr>
-                          </a:solidFill>
-                        </a:rPr>
-                        <a:t>dB SPL</a:t>
-                      </a:r>
-                    </a:p>
-                  </a:txBody>
-                  <a:tcPr>
-                    <a:solidFill>
-                      <a:schemeClr val="bg1">
-                        <a:lumMod val="85000"/>
-                      </a:schemeClr>
-                    </a:solidFill>
-                  </a:tcPr>
-                </a:tc>
-                <a:extLst>
-                  <a:ext uri="{0D108BD9-81ED-4DB2-BD59-A6C34878D82A}">
-                    <a16:rowId xmlns:a16="http://schemas.microsoft.com/office/drawing/2014/main" val="2407321425"/>
-                  </a:ext>
-                </a:extLst>
-              </a:tr>
-            </a:tbl>
-          </a:graphicData>
-        </a:graphic>
-      </p:graphicFrame>
       <p:sp>
         <p:nvSpPr>
           <p:cNvPr id="17" name="Flowchart: Terminator 16">

</xml_diff>

<commit_message>
Add live results and related verification itmes
</commit_message>
<xml_diff>
--- a/Specifications/swept-oae/GUI-Screens.pptx
+++ b/Specifications/swept-oae/GUI-Screens.pptx
@@ -261,7 +261,7 @@
           <a:p>
             <a:fld id="{6E783203-F72E-42D3-9F56-E7123AD26E23}" type="datetimeFigureOut">
               <a:rPr lang="en-US" smtClean="0"/>
-              <a:t>11/15/2024</a:t>
+              <a:t>11/21/2024</a:t>
             </a:fld>
             <a:endParaRPr lang="en-US"/>
           </a:p>
@@ -459,7 +459,7 @@
           <a:p>
             <a:fld id="{6E783203-F72E-42D3-9F56-E7123AD26E23}" type="datetimeFigureOut">
               <a:rPr lang="en-US" smtClean="0"/>
-              <a:t>11/15/2024</a:t>
+              <a:t>11/21/2024</a:t>
             </a:fld>
             <a:endParaRPr lang="en-US"/>
           </a:p>
@@ -667,7 +667,7 @@
           <a:p>
             <a:fld id="{6E783203-F72E-42D3-9F56-E7123AD26E23}" type="datetimeFigureOut">
               <a:rPr lang="en-US" smtClean="0"/>
-              <a:t>11/15/2024</a:t>
+              <a:t>11/21/2024</a:t>
             </a:fld>
             <a:endParaRPr lang="en-US"/>
           </a:p>
@@ -865,7 +865,7 @@
           <a:p>
             <a:fld id="{6E783203-F72E-42D3-9F56-E7123AD26E23}" type="datetimeFigureOut">
               <a:rPr lang="en-US" smtClean="0"/>
-              <a:t>11/15/2024</a:t>
+              <a:t>11/21/2024</a:t>
             </a:fld>
             <a:endParaRPr lang="en-US"/>
           </a:p>
@@ -1140,7 +1140,7 @@
           <a:p>
             <a:fld id="{6E783203-F72E-42D3-9F56-E7123AD26E23}" type="datetimeFigureOut">
               <a:rPr lang="en-US" smtClean="0"/>
-              <a:t>11/15/2024</a:t>
+              <a:t>11/21/2024</a:t>
             </a:fld>
             <a:endParaRPr lang="en-US"/>
           </a:p>
@@ -1405,7 +1405,7 @@
           <a:p>
             <a:fld id="{6E783203-F72E-42D3-9F56-E7123AD26E23}" type="datetimeFigureOut">
               <a:rPr lang="en-US" smtClean="0"/>
-              <a:t>11/15/2024</a:t>
+              <a:t>11/21/2024</a:t>
             </a:fld>
             <a:endParaRPr lang="en-US"/>
           </a:p>
@@ -1817,7 +1817,7 @@
           <a:p>
             <a:fld id="{6E783203-F72E-42D3-9F56-E7123AD26E23}" type="datetimeFigureOut">
               <a:rPr lang="en-US" smtClean="0"/>
-              <a:t>11/15/2024</a:t>
+              <a:t>11/21/2024</a:t>
             </a:fld>
             <a:endParaRPr lang="en-US"/>
           </a:p>
@@ -1958,7 +1958,7 @@
           <a:p>
             <a:fld id="{6E783203-F72E-42D3-9F56-E7123AD26E23}" type="datetimeFigureOut">
               <a:rPr lang="en-US" smtClean="0"/>
-              <a:t>11/15/2024</a:t>
+              <a:t>11/21/2024</a:t>
             </a:fld>
             <a:endParaRPr lang="en-US"/>
           </a:p>
@@ -2071,7 +2071,7 @@
           <a:p>
             <a:fld id="{6E783203-F72E-42D3-9F56-E7123AD26E23}" type="datetimeFigureOut">
               <a:rPr lang="en-US" smtClean="0"/>
-              <a:t>11/15/2024</a:t>
+              <a:t>11/21/2024</a:t>
             </a:fld>
             <a:endParaRPr lang="en-US"/>
           </a:p>
@@ -2382,7 +2382,7 @@
           <a:p>
             <a:fld id="{6E783203-F72E-42D3-9F56-E7123AD26E23}" type="datetimeFigureOut">
               <a:rPr lang="en-US" smtClean="0"/>
-              <a:t>11/15/2024</a:t>
+              <a:t>11/21/2024</a:t>
             </a:fld>
             <a:endParaRPr lang="en-US"/>
           </a:p>
@@ -2670,7 +2670,7 @@
           <a:p>
             <a:fld id="{6E783203-F72E-42D3-9F56-E7123AD26E23}" type="datetimeFigureOut">
               <a:rPr lang="en-US" smtClean="0"/>
-              <a:t>11/15/2024</a:t>
+              <a:t>11/21/2024</a:t>
             </a:fld>
             <a:endParaRPr lang="en-US"/>
           </a:p>
@@ -2911,7 +2911,7 @@
           <a:p>
             <a:fld id="{6E783203-F72E-42D3-9F56-E7123AD26E23}" type="datetimeFigureOut">
               <a:rPr lang="en-US" smtClean="0"/>
-              <a:t>11/15/2024</a:t>
+              <a:t>11/21/2024</a:t>
             </a:fld>
             <a:endParaRPr lang="en-US"/>
           </a:p>
@@ -4927,628 +4927,6 @@
           </a:p>
         </p:txBody>
       </p:sp>
-      <p:graphicFrame>
-        <p:nvGraphicFramePr>
-          <p:cNvPr id="13" name="Table 12">
-            <a:extLst>
-              <a:ext uri="{FF2B5EF4-FFF2-40B4-BE49-F238E27FC236}">
-                <a16:creationId xmlns:a16="http://schemas.microsoft.com/office/drawing/2014/main" id="{A1F86302-C652-83AF-24BD-7801A5146468}"/>
-              </a:ext>
-            </a:extLst>
-          </p:cNvPr>
-          <p:cNvGraphicFramePr>
-            <a:graphicFrameLocks noGrp="1"/>
-          </p:cNvGraphicFramePr>
-          <p:nvPr>
-            <p:extLst>
-              <p:ext uri="{D42A27DB-BD31-4B8C-83A1-F6EECF244321}">
-                <p14:modId xmlns:p14="http://schemas.microsoft.com/office/powerpoint/2010/main" val="811630087"/>
-              </p:ext>
-            </p:extLst>
-          </p:nvPr>
-        </p:nvGraphicFramePr>
-        <p:xfrm>
-          <a:off x="3678348" y="1422249"/>
-          <a:ext cx="4795974" cy="3048000"/>
-        </p:xfrm>
-        <a:graphic>
-          <a:graphicData uri="http://schemas.openxmlformats.org/drawingml/2006/table">
-            <a:tbl>
-              <a:tblPr firstRow="1" bandRow="1">
-                <a:tableStyleId>{5C22544A-7EE6-4342-B048-85BDC9FD1C3A}</a:tableStyleId>
-              </a:tblPr>
-              <a:tblGrid>
-                <a:gridCol w="2397987">
-                  <a:extLst>
-                    <a:ext uri="{9D8B030D-6E8A-4147-A177-3AD203B41FA5}">
-                      <a16:colId xmlns:a16="http://schemas.microsoft.com/office/drawing/2014/main" val="2668354969"/>
-                    </a:ext>
-                  </a:extLst>
-                </a:gridCol>
-                <a:gridCol w="2397987">
-                  <a:extLst>
-                    <a:ext uri="{9D8B030D-6E8A-4147-A177-3AD203B41FA5}">
-                      <a16:colId xmlns:a16="http://schemas.microsoft.com/office/drawing/2014/main" val="3965875387"/>
-                    </a:ext>
-                  </a:extLst>
-                </a:gridCol>
-              </a:tblGrid>
-              <a:tr h="281251">
-                <a:tc>
-                  <a:txBody>
-                    <a:bodyPr/>
-                    <a:lstStyle/>
-                    <a:p>
-                      <a:pPr algn="ctr"/>
-                      <a:r>
-                        <a:rPr lang="en-US" sz="1400" dirty="0">
-                          <a:solidFill>
-                            <a:schemeClr val="bg2">
-                              <a:lumMod val="25000"/>
-                            </a:schemeClr>
-                          </a:solidFill>
-                        </a:rPr>
-                        <a:t>Parameter</a:t>
-                      </a:r>
-                    </a:p>
-                  </a:txBody>
-                  <a:tcPr>
-                    <a:solidFill>
-                      <a:schemeClr val="bg1">
-                        <a:lumMod val="85000"/>
-                      </a:schemeClr>
-                    </a:solidFill>
-                  </a:tcPr>
-                </a:tc>
-                <a:tc>
-                  <a:txBody>
-                    <a:bodyPr/>
-                    <a:lstStyle/>
-                    <a:p>
-                      <a:pPr algn="ctr"/>
-                      <a:r>
-                        <a:rPr lang="en-US" sz="1400" dirty="0">
-                          <a:solidFill>
-                            <a:schemeClr val="bg2">
-                              <a:lumMod val="25000"/>
-                            </a:schemeClr>
-                          </a:solidFill>
-                        </a:rPr>
-                        <a:t>Value</a:t>
-                      </a:r>
-                    </a:p>
-                  </a:txBody>
-                  <a:tcPr>
-                    <a:solidFill>
-                      <a:schemeClr val="bg1">
-                        <a:lumMod val="85000"/>
-                      </a:schemeClr>
-                    </a:solidFill>
-                  </a:tcPr>
-                </a:tc>
-                <a:extLst>
-                  <a:ext uri="{0D108BD9-81ED-4DB2-BD59-A6C34878D82A}">
-                    <a16:rowId xmlns:a16="http://schemas.microsoft.com/office/drawing/2014/main" val="2673981942"/>
-                  </a:ext>
-                </a:extLst>
-              </a:tr>
-              <a:tr h="277398">
-                <a:tc>
-                  <a:txBody>
-                    <a:bodyPr/>
-                    <a:lstStyle/>
-                    <a:p>
-                      <a:r>
-                        <a:rPr lang="en-US" sz="1400" dirty="0">
-                          <a:solidFill>
-                            <a:schemeClr val="bg2">
-                              <a:lumMod val="25000"/>
-                            </a:schemeClr>
-                          </a:solidFill>
-                        </a:rPr>
-                        <a:t>Start Frequency [Hz]</a:t>
-                      </a:r>
-                    </a:p>
-                  </a:txBody>
-                  <a:tcPr>
-                    <a:solidFill>
-                      <a:schemeClr val="bg1">
-                        <a:lumMod val="85000"/>
-                      </a:schemeClr>
-                    </a:solidFill>
-                  </a:tcPr>
-                </a:tc>
-                <a:tc>
-                  <a:txBody>
-                    <a:bodyPr/>
-                    <a:lstStyle/>
-                    <a:p>
-                      <a:r>
-                        <a:rPr lang="en-US" sz="1400" dirty="0">
-                          <a:solidFill>
-                            <a:schemeClr val="bg2">
-                              <a:lumMod val="25000"/>
-                            </a:schemeClr>
-                          </a:solidFill>
-                        </a:rPr>
-                        <a:t>[start_F2]</a:t>
-                      </a:r>
-                    </a:p>
-                  </a:txBody>
-                  <a:tcPr>
-                    <a:solidFill>
-                      <a:schemeClr val="bg1">
-                        <a:lumMod val="85000"/>
-                      </a:schemeClr>
-                    </a:solidFill>
-                  </a:tcPr>
-                </a:tc>
-                <a:extLst>
-                  <a:ext uri="{0D108BD9-81ED-4DB2-BD59-A6C34878D82A}">
-                    <a16:rowId xmlns:a16="http://schemas.microsoft.com/office/drawing/2014/main" val="1306087800"/>
-                  </a:ext>
-                </a:extLst>
-              </a:tr>
-              <a:tr h="281251">
-                <a:tc>
-                  <a:txBody>
-                    <a:bodyPr/>
-                    <a:lstStyle/>
-                    <a:p>
-                      <a:r>
-                        <a:rPr lang="en-US" sz="1400" dirty="0">
-                          <a:solidFill>
-                            <a:schemeClr val="bg2">
-                              <a:lumMod val="25000"/>
-                            </a:schemeClr>
-                          </a:solidFill>
-                        </a:rPr>
-                        <a:t>End Frequency [Hz]</a:t>
-                      </a:r>
-                    </a:p>
-                  </a:txBody>
-                  <a:tcPr>
-                    <a:solidFill>
-                      <a:schemeClr val="bg1">
-                        <a:lumMod val="85000"/>
-                      </a:schemeClr>
-                    </a:solidFill>
-                  </a:tcPr>
-                </a:tc>
-                <a:tc>
-                  <a:txBody>
-                    <a:bodyPr/>
-                    <a:lstStyle/>
-                    <a:p>
-                      <a:r>
-                        <a:rPr lang="en-US" sz="1400" dirty="0">
-                          <a:solidFill>
-                            <a:schemeClr val="bg2">
-                              <a:lumMod val="25000"/>
-                            </a:schemeClr>
-                          </a:solidFill>
-                        </a:rPr>
-                        <a:t>[end_F2]</a:t>
-                      </a:r>
-                    </a:p>
-                  </a:txBody>
-                  <a:tcPr>
-                    <a:solidFill>
-                      <a:schemeClr val="bg1">
-                        <a:lumMod val="85000"/>
-                      </a:schemeClr>
-                    </a:solidFill>
-                  </a:tcPr>
-                </a:tc>
-                <a:extLst>
-                  <a:ext uri="{0D108BD9-81ED-4DB2-BD59-A6C34878D82A}">
-                    <a16:rowId xmlns:a16="http://schemas.microsoft.com/office/drawing/2014/main" val="865106306"/>
-                  </a:ext>
-                </a:extLst>
-              </a:tr>
-              <a:tr h="281251">
-                <a:tc>
-                  <a:txBody>
-                    <a:bodyPr/>
-                    <a:lstStyle/>
-                    <a:p>
-                      <a:r>
-                        <a:rPr lang="en-US" sz="1400" dirty="0">
-                          <a:solidFill>
-                            <a:schemeClr val="bg2">
-                              <a:lumMod val="25000"/>
-                            </a:schemeClr>
-                          </a:solidFill>
-                        </a:rPr>
-                        <a:t>Ratio</a:t>
-                      </a:r>
-                    </a:p>
-                  </a:txBody>
-                  <a:tcPr>
-                    <a:solidFill>
-                      <a:schemeClr val="bg1">
-                        <a:lumMod val="85000"/>
-                      </a:schemeClr>
-                    </a:solidFill>
-                  </a:tcPr>
-                </a:tc>
-                <a:tc>
-                  <a:txBody>
-                    <a:bodyPr/>
-                    <a:lstStyle/>
-                    <a:p>
-                      <a:r>
-                        <a:rPr lang="en-US" sz="1400" dirty="0">
-                          <a:solidFill>
-                            <a:schemeClr val="bg2">
-                              <a:lumMod val="25000"/>
-                            </a:schemeClr>
-                          </a:solidFill>
-                        </a:rPr>
-                        <a:t>[ratioF]</a:t>
-                      </a:r>
-                    </a:p>
-                  </a:txBody>
-                  <a:tcPr>
-                    <a:solidFill>
-                      <a:schemeClr val="bg1">
-                        <a:lumMod val="85000"/>
-                      </a:schemeClr>
-                    </a:solidFill>
-                  </a:tcPr>
-                </a:tc>
-                <a:extLst>
-                  <a:ext uri="{0D108BD9-81ED-4DB2-BD59-A6C34878D82A}">
-                    <a16:rowId xmlns:a16="http://schemas.microsoft.com/office/drawing/2014/main" val="195460091"/>
-                  </a:ext>
-                </a:extLst>
-              </a:tr>
-              <a:tr h="281251">
-                <a:tc>
-                  <a:txBody>
-                    <a:bodyPr/>
-                    <a:lstStyle/>
-                    <a:p>
-                      <a:r>
-                        <a:rPr lang="en-US" sz="1400" dirty="0">
-                          <a:solidFill>
-                            <a:schemeClr val="bg2">
-                              <a:lumMod val="25000"/>
-                            </a:schemeClr>
-                          </a:solidFill>
-                        </a:rPr>
-                        <a:t>Sweep Duration [s]</a:t>
-                      </a:r>
-                    </a:p>
-                  </a:txBody>
-                  <a:tcPr>
-                    <a:solidFill>
-                      <a:schemeClr val="bg1">
-                        <a:lumMod val="85000"/>
-                      </a:schemeClr>
-                    </a:solidFill>
-                  </a:tcPr>
-                </a:tc>
-                <a:tc>
-                  <a:txBody>
-                    <a:bodyPr/>
-                    <a:lstStyle/>
-                    <a:p>
-                      <a:r>
-                        <a:rPr lang="en-US" sz="1400" dirty="0">
-                          <a:solidFill>
-                            <a:schemeClr val="bg2">
-                              <a:lumMod val="25000"/>
-                            </a:schemeClr>
-                          </a:solidFill>
-                        </a:rPr>
-                        <a:t>[SweepDuration]</a:t>
-                      </a:r>
-                    </a:p>
-                  </a:txBody>
-                  <a:tcPr>
-                    <a:solidFill>
-                      <a:schemeClr val="bg1">
-                        <a:lumMod val="85000"/>
-                      </a:schemeClr>
-                    </a:solidFill>
-                  </a:tcPr>
-                </a:tc>
-                <a:extLst>
-                  <a:ext uri="{0D108BD9-81ED-4DB2-BD59-A6C34878D82A}">
-                    <a16:rowId xmlns:a16="http://schemas.microsoft.com/office/drawing/2014/main" val="3721407146"/>
-                  </a:ext>
-                </a:extLst>
-              </a:tr>
-              <a:tr h="281251">
-                <a:tc>
-                  <a:txBody>
-                    <a:bodyPr/>
-                    <a:lstStyle/>
-                    <a:p>
-                      <a:r>
-                        <a:rPr lang="en-US" sz="1400" dirty="0">
-                          <a:solidFill>
-                            <a:schemeClr val="bg2">
-                              <a:lumMod val="25000"/>
-                            </a:schemeClr>
-                          </a:solidFill>
-                        </a:rPr>
-                        <a:t>Window Duration [s]</a:t>
-                      </a:r>
-                    </a:p>
-                  </a:txBody>
-                  <a:tcPr>
-                    <a:solidFill>
-                      <a:schemeClr val="bg1">
-                        <a:lumMod val="85000"/>
-                      </a:schemeClr>
-                    </a:solidFill>
-                  </a:tcPr>
-                </a:tc>
-                <a:tc>
-                  <a:txBody>
-                    <a:bodyPr/>
-                    <a:lstStyle/>
-                    <a:p>
-                      <a:r>
-                        <a:rPr lang="en-US" sz="1400" dirty="0">
-                          <a:solidFill>
-                            <a:schemeClr val="bg2">
-                              <a:lumMod val="25000"/>
-                            </a:schemeClr>
-                          </a:solidFill>
-                        </a:rPr>
-                        <a:t>[WindowDuration]</a:t>
-                      </a:r>
-                    </a:p>
-                  </a:txBody>
-                  <a:tcPr>
-                    <a:solidFill>
-                      <a:schemeClr val="bg1">
-                        <a:lumMod val="85000"/>
-                      </a:schemeClr>
-                    </a:solidFill>
-                  </a:tcPr>
-                </a:tc>
-                <a:extLst>
-                  <a:ext uri="{0D108BD9-81ED-4DB2-BD59-A6C34878D82A}">
-                    <a16:rowId xmlns:a16="http://schemas.microsoft.com/office/drawing/2014/main" val="328923842"/>
-                  </a:ext>
-                </a:extLst>
-              </a:tr>
-              <a:tr h="281251">
-                <a:tc>
-                  <a:txBody>
-                    <a:bodyPr/>
-                    <a:lstStyle/>
-                    <a:p>
-                      <a:r>
-                        <a:rPr lang="en-US" sz="1400" dirty="0">
-                          <a:solidFill>
-                            <a:schemeClr val="bg2">
-                              <a:lumMod val="25000"/>
-                            </a:schemeClr>
-                          </a:solidFill>
-                        </a:rPr>
-                        <a:t>Sweep Type</a:t>
-                      </a:r>
-                    </a:p>
-                  </a:txBody>
-                  <a:tcPr>
-                    <a:solidFill>
-                      <a:schemeClr val="bg1">
-                        <a:lumMod val="85000"/>
-                      </a:schemeClr>
-                    </a:solidFill>
-                  </a:tcPr>
-                </a:tc>
-                <a:tc>
-                  <a:txBody>
-                    <a:bodyPr/>
-                    <a:lstStyle/>
-                    <a:p>
-                      <a:r>
-                        <a:rPr lang="en-US" sz="1400" dirty="0">
-                          <a:solidFill>
-                            <a:schemeClr val="bg2">
-                              <a:lumMod val="25000"/>
-                            </a:schemeClr>
-                          </a:solidFill>
-                        </a:rPr>
-                        <a:t>[log/linear]</a:t>
-                      </a:r>
-                    </a:p>
-                  </a:txBody>
-                  <a:tcPr>
-                    <a:solidFill>
-                      <a:schemeClr val="bg1">
-                        <a:lumMod val="85000"/>
-                      </a:schemeClr>
-                    </a:solidFill>
-                  </a:tcPr>
-                </a:tc>
-                <a:extLst>
-                  <a:ext uri="{0D108BD9-81ED-4DB2-BD59-A6C34878D82A}">
-                    <a16:rowId xmlns:a16="http://schemas.microsoft.com/office/drawing/2014/main" val="205406906"/>
-                  </a:ext>
-                </a:extLst>
-              </a:tr>
-              <a:tr h="281251">
-                <a:tc>
-                  <a:txBody>
-                    <a:bodyPr/>
-                    <a:lstStyle/>
-                    <a:p>
-                      <a:r>
-                        <a:rPr lang="en-US" sz="1400" dirty="0">
-                          <a:solidFill>
-                            <a:schemeClr val="bg2">
-                              <a:lumMod val="25000"/>
-                            </a:schemeClr>
-                          </a:solidFill>
-                        </a:rPr>
-                        <a:t>Minimum Num Sweeps</a:t>
-                      </a:r>
-                    </a:p>
-                  </a:txBody>
-                  <a:tcPr>
-                    <a:solidFill>
-                      <a:schemeClr val="bg1">
-                        <a:lumMod val="85000"/>
-                      </a:schemeClr>
-                    </a:solidFill>
-                  </a:tcPr>
-                </a:tc>
-                <a:tc>
-                  <a:txBody>
-                    <a:bodyPr/>
-                    <a:lstStyle/>
-                    <a:p>
-                      <a:r>
-                        <a:rPr lang="en-US" sz="1400" dirty="0">
-                          <a:solidFill>
-                            <a:schemeClr val="bg2">
-                              <a:lumMod val="25000"/>
-                            </a:schemeClr>
-                          </a:solidFill>
-                        </a:rPr>
-                        <a:t>[MinSweeps]</a:t>
-                      </a:r>
-                    </a:p>
-                  </a:txBody>
-                  <a:tcPr>
-                    <a:solidFill>
-                      <a:schemeClr val="bg1">
-                        <a:lumMod val="85000"/>
-                      </a:schemeClr>
-                    </a:solidFill>
-                  </a:tcPr>
-                </a:tc>
-                <a:extLst>
-                  <a:ext uri="{0D108BD9-81ED-4DB2-BD59-A6C34878D82A}">
-                    <a16:rowId xmlns:a16="http://schemas.microsoft.com/office/drawing/2014/main" val="2397434598"/>
-                  </a:ext>
-                </a:extLst>
-              </a:tr>
-              <a:tr h="281251">
-                <a:tc>
-                  <a:txBody>
-                    <a:bodyPr/>
-                    <a:lstStyle/>
-                    <a:p>
-                      <a:r>
-                        <a:rPr lang="en-US" sz="1400" dirty="0">
-                          <a:solidFill>
-                            <a:schemeClr val="bg2">
-                              <a:lumMod val="25000"/>
-                            </a:schemeClr>
-                          </a:solidFill>
-                        </a:rPr>
-                        <a:t>Maximum Num Sweeps</a:t>
-                      </a:r>
-                    </a:p>
-                  </a:txBody>
-                  <a:tcPr>
-                    <a:solidFill>
-                      <a:schemeClr val="bg1">
-                        <a:lumMod val="85000"/>
-                      </a:schemeClr>
-                    </a:solidFill>
-                  </a:tcPr>
-                </a:tc>
-                <a:tc>
-                  <a:txBody>
-                    <a:bodyPr/>
-                    <a:lstStyle/>
-                    <a:p>
-                      <a:r>
-                        <a:rPr lang="en-US" sz="1400" dirty="0">
-                          <a:solidFill>
-                            <a:schemeClr val="bg2">
-                              <a:lumMod val="25000"/>
-                            </a:schemeClr>
-                          </a:solidFill>
-                        </a:rPr>
-                        <a:t>[MaxSweeps]</a:t>
-                      </a:r>
-                    </a:p>
-                  </a:txBody>
-                  <a:tcPr>
-                    <a:solidFill>
-                      <a:schemeClr val="bg1">
-                        <a:lumMod val="85000"/>
-                      </a:schemeClr>
-                    </a:solidFill>
-                  </a:tcPr>
-                </a:tc>
-                <a:extLst>
-                  <a:ext uri="{0D108BD9-81ED-4DB2-BD59-A6C34878D82A}">
-                    <a16:rowId xmlns:a16="http://schemas.microsoft.com/office/drawing/2014/main" val="3148996428"/>
-                  </a:ext>
-                </a:extLst>
-              </a:tr>
-              <a:tr h="281251">
-                <a:tc>
-                  <a:txBody>
-                    <a:bodyPr/>
-                    <a:lstStyle/>
-                    <a:p>
-                      <a:r>
-                        <a:rPr lang="en-US" sz="1400" dirty="0">
-                          <a:solidFill>
-                            <a:schemeClr val="bg2">
-                              <a:lumMod val="25000"/>
-                            </a:schemeClr>
-                          </a:solidFill>
-                        </a:rPr>
-                        <a:t>Noise Floor Threshold</a:t>
-                      </a:r>
-                    </a:p>
-                  </a:txBody>
-                  <a:tcPr>
-                    <a:solidFill>
-                      <a:schemeClr val="bg1">
-                        <a:lumMod val="85000"/>
-                      </a:schemeClr>
-                    </a:solidFill>
-                  </a:tcPr>
-                </a:tc>
-                <a:tc>
-                  <a:txBody>
-                    <a:bodyPr/>
-                    <a:lstStyle/>
-                    <a:p>
-                      <a:r>
-                        <a:rPr lang="en-US" sz="1400" dirty="0">
-                          <a:solidFill>
-                            <a:schemeClr val="bg2">
-                              <a:lumMod val="25000"/>
-                            </a:schemeClr>
-                          </a:solidFill>
-                        </a:rPr>
-                        <a:t>[MinDpNoiseFloorThresh]</a:t>
-                      </a:r>
-                    </a:p>
-                  </a:txBody>
-                  <a:tcPr>
-                    <a:solidFill>
-                      <a:schemeClr val="bg1">
-                        <a:lumMod val="85000"/>
-                      </a:schemeClr>
-                    </a:solidFill>
-                  </a:tcPr>
-                </a:tc>
-                <a:extLst>
-                  <a:ext uri="{0D108BD9-81ED-4DB2-BD59-A6C34878D82A}">
-                    <a16:rowId xmlns:a16="http://schemas.microsoft.com/office/drawing/2014/main" val="3605474839"/>
-                  </a:ext>
-                </a:extLst>
-              </a:tr>
-            </a:tbl>
-          </a:graphicData>
-        </a:graphic>
-      </p:graphicFrame>
       <p:sp>
         <p:nvSpPr>
           <p:cNvPr id="7" name="Rectangle: Rounded Corners 6">
@@ -5746,6 +5124,46 @@
           </a:p>
         </p:txBody>
       </p:sp>
+      <p:pic>
+        <p:nvPicPr>
+          <p:cNvPr id="17" name="Picture 16">
+            <a:extLst>
+              <a:ext uri="{FF2B5EF4-FFF2-40B4-BE49-F238E27FC236}">
+                <a16:creationId xmlns:a16="http://schemas.microsoft.com/office/drawing/2014/main" id="{896BA1FF-F271-64E6-68D6-A07375F18B62}"/>
+              </a:ext>
+            </a:extLst>
+          </p:cNvPr>
+          <p:cNvPicPr>
+            <a:picLocks noChangeAspect="1"/>
+          </p:cNvPicPr>
+          <p:nvPr/>
+        </p:nvPicPr>
+        <p:blipFill>
+          <a:blip r:embed="rId4">
+            <a:extLst>
+              <a:ext uri="{28A0092B-C50C-407E-A947-70E740481C1C}">
+                <a14:useLocalDpi xmlns:a14="http://schemas.microsoft.com/office/drawing/2010/main" val="0"/>
+              </a:ext>
+            </a:extLst>
+          </a:blip>
+          <a:srcRect l="575" t="21456" r="6284" b="447"/>
+          <a:stretch/>
+        </p:blipFill>
+        <p:spPr>
+          <a:xfrm>
+            <a:off x="4039468" y="1491716"/>
+            <a:ext cx="3957220" cy="2987416"/>
+          </a:xfrm>
+          <a:prstGeom prst="rect">
+            <a:avLst/>
+          </a:prstGeom>
+          <a:ln>
+            <a:solidFill>
+              <a:schemeClr val="tx1"/>
+            </a:solidFill>
+          </a:ln>
+        </p:spPr>
+      </p:pic>
     </p:spTree>
     <p:extLst>
       <p:ext uri="{BB962C8B-B14F-4D97-AF65-F5344CB8AC3E}">

</xml_diff>

<commit_message>
live view updates after Purdue discussion
</commit_message>
<xml_diff>
--- a/Specifications/swept-oae/GUI-Screens.pptx
+++ b/Specifications/swept-oae/GUI-Screens.pptx
@@ -261,7 +261,7 @@
           <a:p>
             <a:fld id="{6E783203-F72E-42D3-9F56-E7123AD26E23}" type="datetimeFigureOut">
               <a:rPr lang="en-US" smtClean="0"/>
-              <a:t>11/21/2024</a:t>
+              <a:t>11/22/2024</a:t>
             </a:fld>
             <a:endParaRPr lang="en-US"/>
           </a:p>
@@ -459,7 +459,7 @@
           <a:p>
             <a:fld id="{6E783203-F72E-42D3-9F56-E7123AD26E23}" type="datetimeFigureOut">
               <a:rPr lang="en-US" smtClean="0"/>
-              <a:t>11/21/2024</a:t>
+              <a:t>11/22/2024</a:t>
             </a:fld>
             <a:endParaRPr lang="en-US"/>
           </a:p>
@@ -667,7 +667,7 @@
           <a:p>
             <a:fld id="{6E783203-F72E-42D3-9F56-E7123AD26E23}" type="datetimeFigureOut">
               <a:rPr lang="en-US" smtClean="0"/>
-              <a:t>11/21/2024</a:t>
+              <a:t>11/22/2024</a:t>
             </a:fld>
             <a:endParaRPr lang="en-US"/>
           </a:p>
@@ -865,7 +865,7 @@
           <a:p>
             <a:fld id="{6E783203-F72E-42D3-9F56-E7123AD26E23}" type="datetimeFigureOut">
               <a:rPr lang="en-US" smtClean="0"/>
-              <a:t>11/21/2024</a:t>
+              <a:t>11/22/2024</a:t>
             </a:fld>
             <a:endParaRPr lang="en-US"/>
           </a:p>
@@ -1140,7 +1140,7 @@
           <a:p>
             <a:fld id="{6E783203-F72E-42D3-9F56-E7123AD26E23}" type="datetimeFigureOut">
               <a:rPr lang="en-US" smtClean="0"/>
-              <a:t>11/21/2024</a:t>
+              <a:t>11/22/2024</a:t>
             </a:fld>
             <a:endParaRPr lang="en-US"/>
           </a:p>
@@ -1405,7 +1405,7 @@
           <a:p>
             <a:fld id="{6E783203-F72E-42D3-9F56-E7123AD26E23}" type="datetimeFigureOut">
               <a:rPr lang="en-US" smtClean="0"/>
-              <a:t>11/21/2024</a:t>
+              <a:t>11/22/2024</a:t>
             </a:fld>
             <a:endParaRPr lang="en-US"/>
           </a:p>
@@ -1817,7 +1817,7 @@
           <a:p>
             <a:fld id="{6E783203-F72E-42D3-9F56-E7123AD26E23}" type="datetimeFigureOut">
               <a:rPr lang="en-US" smtClean="0"/>
-              <a:t>11/21/2024</a:t>
+              <a:t>11/22/2024</a:t>
             </a:fld>
             <a:endParaRPr lang="en-US"/>
           </a:p>
@@ -1958,7 +1958,7 @@
           <a:p>
             <a:fld id="{6E783203-F72E-42D3-9F56-E7123AD26E23}" type="datetimeFigureOut">
               <a:rPr lang="en-US" smtClean="0"/>
-              <a:t>11/21/2024</a:t>
+              <a:t>11/22/2024</a:t>
             </a:fld>
             <a:endParaRPr lang="en-US"/>
           </a:p>
@@ -2071,7 +2071,7 @@
           <a:p>
             <a:fld id="{6E783203-F72E-42D3-9F56-E7123AD26E23}" type="datetimeFigureOut">
               <a:rPr lang="en-US" smtClean="0"/>
-              <a:t>11/21/2024</a:t>
+              <a:t>11/22/2024</a:t>
             </a:fld>
             <a:endParaRPr lang="en-US"/>
           </a:p>
@@ -2382,7 +2382,7 @@
           <a:p>
             <a:fld id="{6E783203-F72E-42D3-9F56-E7123AD26E23}" type="datetimeFigureOut">
               <a:rPr lang="en-US" smtClean="0"/>
-              <a:t>11/21/2024</a:t>
+              <a:t>11/22/2024</a:t>
             </a:fld>
             <a:endParaRPr lang="en-US"/>
           </a:p>
@@ -2670,7 +2670,7 @@
           <a:p>
             <a:fld id="{6E783203-F72E-42D3-9F56-E7123AD26E23}" type="datetimeFigureOut">
               <a:rPr lang="en-US" smtClean="0"/>
-              <a:t>11/21/2024</a:t>
+              <a:t>11/22/2024</a:t>
             </a:fld>
             <a:endParaRPr lang="en-US"/>
           </a:p>
@@ -2911,7 +2911,7 @@
           <a:p>
             <a:fld id="{6E783203-F72E-42D3-9F56-E7123AD26E23}" type="datetimeFigureOut">
               <a:rPr lang="en-US" smtClean="0"/>
-              <a:t>11/21/2024</a:t>
+              <a:t>11/22/2024</a:t>
             </a:fld>
             <a:endParaRPr lang="en-US"/>
           </a:p>
@@ -5164,6 +5164,111 @@
           </a:ln>
         </p:spPr>
       </p:pic>
+      <p:sp>
+        <p:nvSpPr>
+          <p:cNvPr id="13" name="Rectangle 12">
+            <a:extLst>
+              <a:ext uri="{FF2B5EF4-FFF2-40B4-BE49-F238E27FC236}">
+                <a16:creationId xmlns:a16="http://schemas.microsoft.com/office/drawing/2014/main" id="{2565031A-1428-14DC-3301-DAAEC6E27F92}"/>
+              </a:ext>
+            </a:extLst>
+          </p:cNvPr>
+          <p:cNvSpPr/>
+          <p:nvPr/>
+        </p:nvSpPr>
+        <p:spPr>
+          <a:xfrm>
+            <a:off x="6600074" y="1594980"/>
+            <a:ext cx="1196282" cy="640483"/>
+          </a:xfrm>
+          <a:prstGeom prst="rect">
+            <a:avLst/>
+          </a:prstGeom>
+          <a:solidFill>
+            <a:schemeClr val="bg1"/>
+          </a:solidFill>
+          <a:ln>
+            <a:solidFill>
+              <a:schemeClr val="bg1">
+                <a:lumMod val="75000"/>
+              </a:schemeClr>
+            </a:solidFill>
+          </a:ln>
+        </p:spPr>
+        <p:style>
+          <a:lnRef idx="2">
+            <a:schemeClr val="accent1">
+              <a:shade val="15000"/>
+            </a:schemeClr>
+          </a:lnRef>
+          <a:fillRef idx="1">
+            <a:schemeClr val="accent1"/>
+          </a:fillRef>
+          <a:effectRef idx="0">
+            <a:schemeClr val="accent1"/>
+          </a:effectRef>
+          <a:fontRef idx="minor">
+            <a:schemeClr val="lt1"/>
+          </a:fontRef>
+        </p:style>
+        <p:txBody>
+          <a:bodyPr rtlCol="0" anchor="ctr"/>
+          <a:lstStyle/>
+          <a:p>
+            <a:r>
+              <a:rPr lang="en-US" sz="900" b="1" dirty="0">
+                <a:solidFill>
+                  <a:srgbClr val="0070C0"/>
+                </a:solidFill>
+              </a:rPr>
+              <a:t>O          </a:t>
+            </a:r>
+            <a:r>
+              <a:rPr lang="en-US" sz="900" b="1" dirty="0">
+                <a:solidFill>
+                  <a:schemeClr val="tx1"/>
+                </a:solidFill>
+              </a:rPr>
+              <a:t>DPOAE</a:t>
+            </a:r>
+            <a:endParaRPr lang="en-US" sz="900" b="1" dirty="0">
+              <a:solidFill>
+                <a:srgbClr val="0070C0"/>
+              </a:solidFill>
+            </a:endParaRPr>
+          </a:p>
+          <a:p>
+            <a:endParaRPr lang="en-US" sz="900" dirty="0">
+              <a:solidFill>
+                <a:srgbClr val="0070C0"/>
+              </a:solidFill>
+            </a:endParaRPr>
+          </a:p>
+          <a:p>
+            <a:r>
+              <a:rPr lang="en-US" sz="900" b="1" dirty="0">
+                <a:solidFill>
+                  <a:srgbClr val="C00000"/>
+                </a:solidFill>
+              </a:rPr>
+              <a:t>X          </a:t>
+            </a:r>
+            <a:r>
+              <a:rPr lang="en-US" sz="900" b="1" dirty="0">
+                <a:solidFill>
+                  <a:schemeClr val="tx1"/>
+                </a:solidFill>
+              </a:rPr>
+              <a:t>NOISE</a:t>
+            </a:r>
+            <a:endParaRPr lang="en-US" sz="900" b="1" dirty="0">
+              <a:solidFill>
+                <a:srgbClr val="C00000"/>
+              </a:solidFill>
+            </a:endParaRPr>
+          </a:p>
+        </p:txBody>
+      </p:sp>
     </p:spTree>
     <p:extLst>
       <p:ext uri="{BB962C8B-B14F-4D97-AF65-F5344CB8AC3E}">

</xml_diff>

<commit_message>
live results plot axis updates
</commit_message>
<xml_diff>
--- a/Specifications/swept-oae/GUI-Screens.pptx
+++ b/Specifications/swept-oae/GUI-Screens.pptx
@@ -261,7 +261,7 @@
           <a:p>
             <a:fld id="{6E783203-F72E-42D3-9F56-E7123AD26E23}" type="datetimeFigureOut">
               <a:rPr lang="en-US" smtClean="0"/>
-              <a:t>11/22/2024</a:t>
+              <a:t>12/9/2024</a:t>
             </a:fld>
             <a:endParaRPr lang="en-US"/>
           </a:p>
@@ -459,7 +459,7 @@
           <a:p>
             <a:fld id="{6E783203-F72E-42D3-9F56-E7123AD26E23}" type="datetimeFigureOut">
               <a:rPr lang="en-US" smtClean="0"/>
-              <a:t>11/22/2024</a:t>
+              <a:t>12/9/2024</a:t>
             </a:fld>
             <a:endParaRPr lang="en-US"/>
           </a:p>
@@ -667,7 +667,7 @@
           <a:p>
             <a:fld id="{6E783203-F72E-42D3-9F56-E7123AD26E23}" type="datetimeFigureOut">
               <a:rPr lang="en-US" smtClean="0"/>
-              <a:t>11/22/2024</a:t>
+              <a:t>12/9/2024</a:t>
             </a:fld>
             <a:endParaRPr lang="en-US"/>
           </a:p>
@@ -865,7 +865,7 @@
           <a:p>
             <a:fld id="{6E783203-F72E-42D3-9F56-E7123AD26E23}" type="datetimeFigureOut">
               <a:rPr lang="en-US" smtClean="0"/>
-              <a:t>11/22/2024</a:t>
+              <a:t>12/9/2024</a:t>
             </a:fld>
             <a:endParaRPr lang="en-US"/>
           </a:p>
@@ -1140,7 +1140,7 @@
           <a:p>
             <a:fld id="{6E783203-F72E-42D3-9F56-E7123AD26E23}" type="datetimeFigureOut">
               <a:rPr lang="en-US" smtClean="0"/>
-              <a:t>11/22/2024</a:t>
+              <a:t>12/9/2024</a:t>
             </a:fld>
             <a:endParaRPr lang="en-US"/>
           </a:p>
@@ -1405,7 +1405,7 @@
           <a:p>
             <a:fld id="{6E783203-F72E-42D3-9F56-E7123AD26E23}" type="datetimeFigureOut">
               <a:rPr lang="en-US" smtClean="0"/>
-              <a:t>11/22/2024</a:t>
+              <a:t>12/9/2024</a:t>
             </a:fld>
             <a:endParaRPr lang="en-US"/>
           </a:p>
@@ -1817,7 +1817,7 @@
           <a:p>
             <a:fld id="{6E783203-F72E-42D3-9F56-E7123AD26E23}" type="datetimeFigureOut">
               <a:rPr lang="en-US" smtClean="0"/>
-              <a:t>11/22/2024</a:t>
+              <a:t>12/9/2024</a:t>
             </a:fld>
             <a:endParaRPr lang="en-US"/>
           </a:p>
@@ -1958,7 +1958,7 @@
           <a:p>
             <a:fld id="{6E783203-F72E-42D3-9F56-E7123AD26E23}" type="datetimeFigureOut">
               <a:rPr lang="en-US" smtClean="0"/>
-              <a:t>11/22/2024</a:t>
+              <a:t>12/9/2024</a:t>
             </a:fld>
             <a:endParaRPr lang="en-US"/>
           </a:p>
@@ -2071,7 +2071,7 @@
           <a:p>
             <a:fld id="{6E783203-F72E-42D3-9F56-E7123AD26E23}" type="datetimeFigureOut">
               <a:rPr lang="en-US" smtClean="0"/>
-              <a:t>11/22/2024</a:t>
+              <a:t>12/9/2024</a:t>
             </a:fld>
             <a:endParaRPr lang="en-US"/>
           </a:p>
@@ -2382,7 +2382,7 @@
           <a:p>
             <a:fld id="{6E783203-F72E-42D3-9F56-E7123AD26E23}" type="datetimeFigureOut">
               <a:rPr lang="en-US" smtClean="0"/>
-              <a:t>11/22/2024</a:t>
+              <a:t>12/9/2024</a:t>
             </a:fld>
             <a:endParaRPr lang="en-US"/>
           </a:p>
@@ -2670,7 +2670,7 @@
           <a:p>
             <a:fld id="{6E783203-F72E-42D3-9F56-E7123AD26E23}" type="datetimeFigureOut">
               <a:rPr lang="en-US" smtClean="0"/>
-              <a:t>11/22/2024</a:t>
+              <a:t>12/9/2024</a:t>
             </a:fld>
             <a:endParaRPr lang="en-US"/>
           </a:p>
@@ -2911,7 +2911,7 @@
           <a:p>
             <a:fld id="{6E783203-F72E-42D3-9F56-E7123AD26E23}" type="datetimeFigureOut">
               <a:rPr lang="en-US" smtClean="0"/>
-              <a:t>11/22/2024</a:t>
+              <a:t>12/9/2024</a:t>
             </a:fld>
             <a:endParaRPr lang="en-US"/>
           </a:p>
@@ -3686,7 +3686,7 @@
                     <a:ea typeface="+mn-ea"/>
                     <a:cs typeface="+mn-cs"/>
                   </a:rPr>
-                  <a:t>Title: “Swept OAE” </a:t>
+                  <a:t>Title: “Swept DPOAE” </a:t>
                 </a:r>
                 <a:endParaRPr lang="en-US" b="1" dirty="0"/>
               </a:p>
@@ -4800,7 +4800,7 @@
                     <a:ea typeface="+mn-ea"/>
                     <a:cs typeface="+mn-cs"/>
                   </a:rPr>
-                  <a:t>Title: “Swept OAE” </a:t>
+                  <a:t>Title: “Swept DPOAE” </a:t>
                 </a:r>
                 <a:endParaRPr lang="en-US" b="1" dirty="0"/>
               </a:p>
@@ -5266,6 +5266,558 @@
                 <a:srgbClr val="C00000"/>
               </a:solidFill>
             </a:endParaRPr>
+          </a:p>
+        </p:txBody>
+      </p:sp>
+      <p:sp>
+        <p:nvSpPr>
+          <p:cNvPr id="15" name="Rectangle 14">
+            <a:extLst>
+              <a:ext uri="{FF2B5EF4-FFF2-40B4-BE49-F238E27FC236}">
+                <a16:creationId xmlns:a16="http://schemas.microsoft.com/office/drawing/2014/main" id="{BC400713-2B34-C58C-7C3C-66C1693E2DA5}"/>
+              </a:ext>
+            </a:extLst>
+          </p:cNvPr>
+          <p:cNvSpPr/>
+          <p:nvPr/>
+        </p:nvSpPr>
+        <p:spPr>
+          <a:xfrm>
+            <a:off x="4095278" y="3252159"/>
+            <a:ext cx="189782" cy="854015"/>
+          </a:xfrm>
+          <a:prstGeom prst="rect">
+            <a:avLst/>
+          </a:prstGeom>
+          <a:solidFill>
+            <a:schemeClr val="bg1"/>
+          </a:solidFill>
+          <a:ln>
+            <a:solidFill>
+              <a:schemeClr val="bg1"/>
+            </a:solidFill>
+          </a:ln>
+        </p:spPr>
+        <p:style>
+          <a:lnRef idx="2">
+            <a:schemeClr val="accent1">
+              <a:shade val="15000"/>
+            </a:schemeClr>
+          </a:lnRef>
+          <a:fillRef idx="1">
+            <a:schemeClr val="accent1"/>
+          </a:fillRef>
+          <a:effectRef idx="0">
+            <a:schemeClr val="accent1"/>
+          </a:effectRef>
+          <a:fontRef idx="minor">
+            <a:schemeClr val="lt1"/>
+          </a:fontRef>
+        </p:style>
+        <p:txBody>
+          <a:bodyPr rtlCol="0" anchor="ctr"/>
+          <a:lstStyle/>
+          <a:p>
+            <a:pPr algn="ctr"/>
+            <a:endParaRPr lang="en-US"/>
+          </a:p>
+        </p:txBody>
+      </p:sp>
+      <p:sp>
+        <p:nvSpPr>
+          <p:cNvPr id="24" name="Rectangle 23">
+            <a:extLst>
+              <a:ext uri="{FF2B5EF4-FFF2-40B4-BE49-F238E27FC236}">
+                <a16:creationId xmlns:a16="http://schemas.microsoft.com/office/drawing/2014/main" id="{B156EBAE-98EF-52EB-2209-ED36847F6E12}"/>
+              </a:ext>
+            </a:extLst>
+          </p:cNvPr>
+          <p:cNvSpPr/>
+          <p:nvPr/>
+        </p:nvSpPr>
+        <p:spPr>
+          <a:xfrm>
+            <a:off x="4073972" y="1777042"/>
+            <a:ext cx="245592" cy="1470738"/>
+          </a:xfrm>
+          <a:prstGeom prst="rect">
+            <a:avLst/>
+          </a:prstGeom>
+          <a:solidFill>
+            <a:schemeClr val="bg1"/>
+          </a:solidFill>
+          <a:ln>
+            <a:solidFill>
+              <a:schemeClr val="bg1"/>
+            </a:solidFill>
+          </a:ln>
+        </p:spPr>
+        <p:style>
+          <a:lnRef idx="2">
+            <a:schemeClr val="accent1">
+              <a:shade val="15000"/>
+            </a:schemeClr>
+          </a:lnRef>
+          <a:fillRef idx="1">
+            <a:schemeClr val="accent1"/>
+          </a:fillRef>
+          <a:effectRef idx="0">
+            <a:schemeClr val="accent1"/>
+          </a:effectRef>
+          <a:fontRef idx="minor">
+            <a:schemeClr val="lt1"/>
+          </a:fontRef>
+        </p:style>
+        <p:txBody>
+          <a:bodyPr rtlCol="0" anchor="ctr"/>
+          <a:lstStyle/>
+          <a:p>
+            <a:pPr algn="ctr"/>
+            <a:endParaRPr lang="en-US"/>
+          </a:p>
+        </p:txBody>
+      </p:sp>
+      <p:pic>
+        <p:nvPicPr>
+          <p:cNvPr id="23" name="Picture 22">
+            <a:extLst>
+              <a:ext uri="{FF2B5EF4-FFF2-40B4-BE49-F238E27FC236}">
+                <a16:creationId xmlns:a16="http://schemas.microsoft.com/office/drawing/2014/main" id="{8361E361-0E6C-37E7-B2B8-5EA6CA751E99}"/>
+              </a:ext>
+            </a:extLst>
+          </p:cNvPr>
+          <p:cNvPicPr>
+            <a:picLocks noChangeAspect="1"/>
+          </p:cNvPicPr>
+          <p:nvPr/>
+        </p:nvPicPr>
+        <p:blipFill>
+          <a:blip r:embed="rId5"/>
+          <a:stretch>
+            <a:fillRect/>
+          </a:stretch>
+        </p:blipFill>
+        <p:spPr>
+          <a:xfrm>
+            <a:off x="4079202" y="2074887"/>
+            <a:ext cx="261668" cy="1626079"/>
+          </a:xfrm>
+          <a:prstGeom prst="rect">
+            <a:avLst/>
+          </a:prstGeom>
+        </p:spPr>
+      </p:pic>
+      <p:cxnSp>
+        <p:nvCxnSpPr>
+          <p:cNvPr id="27" name="Straight Connector 26">
+            <a:extLst>
+              <a:ext uri="{FF2B5EF4-FFF2-40B4-BE49-F238E27FC236}">
+                <a16:creationId xmlns:a16="http://schemas.microsoft.com/office/drawing/2014/main" id="{4CED889C-5D23-2D61-E3A7-E444720AB004}"/>
+              </a:ext>
+            </a:extLst>
+          </p:cNvPr>
+          <p:cNvCxnSpPr/>
+          <p:nvPr/>
+        </p:nvCxnSpPr>
+        <p:spPr>
+          <a:xfrm flipH="1">
+            <a:off x="6359097" y="4479132"/>
+            <a:ext cx="895718" cy="0"/>
+          </a:xfrm>
+          <a:prstGeom prst="line">
+            <a:avLst/>
+          </a:prstGeom>
+          <a:ln w="12700"/>
+        </p:spPr>
+        <p:style>
+          <a:lnRef idx="2">
+            <a:schemeClr val="dk1"/>
+          </a:lnRef>
+          <a:fillRef idx="0">
+            <a:schemeClr val="dk1"/>
+          </a:fillRef>
+          <a:effectRef idx="1">
+            <a:schemeClr val="dk1"/>
+          </a:effectRef>
+          <a:fontRef idx="minor">
+            <a:schemeClr val="tx1"/>
+          </a:fontRef>
+        </p:style>
+      </p:cxnSp>
+      <p:sp>
+        <p:nvSpPr>
+          <p:cNvPr id="29" name="Rectangle 28">
+            <a:extLst>
+              <a:ext uri="{FF2B5EF4-FFF2-40B4-BE49-F238E27FC236}">
+                <a16:creationId xmlns:a16="http://schemas.microsoft.com/office/drawing/2014/main" id="{74590467-BED6-E84D-8D50-960D991E4977}"/>
+              </a:ext>
+            </a:extLst>
+          </p:cNvPr>
+          <p:cNvSpPr/>
+          <p:nvPr/>
+        </p:nvSpPr>
+        <p:spPr>
+          <a:xfrm>
+            <a:off x="4364968" y="4123426"/>
+            <a:ext cx="3588590" cy="141512"/>
+          </a:xfrm>
+          <a:prstGeom prst="rect">
+            <a:avLst/>
+          </a:prstGeom>
+          <a:solidFill>
+            <a:schemeClr val="bg1"/>
+          </a:solidFill>
+          <a:ln>
+            <a:solidFill>
+              <a:schemeClr val="bg1"/>
+            </a:solidFill>
+          </a:ln>
+        </p:spPr>
+        <p:style>
+          <a:lnRef idx="2">
+            <a:schemeClr val="accent1">
+              <a:shade val="15000"/>
+            </a:schemeClr>
+          </a:lnRef>
+          <a:fillRef idx="1">
+            <a:schemeClr val="accent1"/>
+          </a:fillRef>
+          <a:effectRef idx="0">
+            <a:schemeClr val="accent1"/>
+          </a:effectRef>
+          <a:fontRef idx="minor">
+            <a:schemeClr val="lt1"/>
+          </a:fontRef>
+        </p:style>
+        <p:txBody>
+          <a:bodyPr rtlCol="0" anchor="ctr"/>
+          <a:lstStyle/>
+          <a:p>
+            <a:pPr algn="ctr"/>
+            <a:endParaRPr lang="en-US"/>
+          </a:p>
+        </p:txBody>
+      </p:sp>
+      <p:sp>
+        <p:nvSpPr>
+          <p:cNvPr id="28" name="TextBox 27">
+            <a:extLst>
+              <a:ext uri="{FF2B5EF4-FFF2-40B4-BE49-F238E27FC236}">
+                <a16:creationId xmlns:a16="http://schemas.microsoft.com/office/drawing/2014/main" id="{F7F157F4-28D8-2958-B2F2-49C6F4D5E7B8}"/>
+              </a:ext>
+            </a:extLst>
+          </p:cNvPr>
+          <p:cNvSpPr txBox="1"/>
+          <p:nvPr/>
+        </p:nvSpPr>
+        <p:spPr>
+          <a:xfrm>
+            <a:off x="4365599" y="4086718"/>
+            <a:ext cx="489922" cy="261610"/>
+          </a:xfrm>
+          <a:prstGeom prst="rect">
+            <a:avLst/>
+          </a:prstGeom>
+          <a:noFill/>
+        </p:spPr>
+        <p:txBody>
+          <a:bodyPr wrap="square" rtlCol="0">
+            <a:spAutoFit/>
+          </a:bodyPr>
+          <a:lstStyle/>
+          <a:p>
+            <a:r>
+              <a:rPr lang="en-US" sz="1100" dirty="0">
+                <a:latin typeface="+mj-lt"/>
+              </a:rPr>
+              <a:t>500</a:t>
+            </a:r>
+            <a:endParaRPr lang="en-US" sz="1050" dirty="0">
+              <a:latin typeface="+mj-lt"/>
+            </a:endParaRPr>
+          </a:p>
+        </p:txBody>
+      </p:sp>
+      <p:sp>
+        <p:nvSpPr>
+          <p:cNvPr id="30" name="TextBox 29">
+            <a:extLst>
+              <a:ext uri="{FF2B5EF4-FFF2-40B4-BE49-F238E27FC236}">
+                <a16:creationId xmlns:a16="http://schemas.microsoft.com/office/drawing/2014/main" id="{E009F830-5BEE-5093-48C6-73D6C67ECF9F}"/>
+              </a:ext>
+            </a:extLst>
+          </p:cNvPr>
+          <p:cNvSpPr txBox="1"/>
+          <p:nvPr/>
+        </p:nvSpPr>
+        <p:spPr>
+          <a:xfrm>
+            <a:off x="5063783" y="4061128"/>
+            <a:ext cx="348519" cy="261610"/>
+          </a:xfrm>
+          <a:prstGeom prst="rect">
+            <a:avLst/>
+          </a:prstGeom>
+          <a:noFill/>
+        </p:spPr>
+        <p:txBody>
+          <a:bodyPr wrap="square" rtlCol="0">
+            <a:spAutoFit/>
+          </a:bodyPr>
+          <a:lstStyle/>
+          <a:p>
+            <a:r>
+              <a:rPr lang="en-US" sz="1100" dirty="0">
+                <a:latin typeface="+mj-lt"/>
+              </a:rPr>
+              <a:t>1k</a:t>
+            </a:r>
+            <a:endParaRPr lang="en-US" sz="1050" dirty="0">
+              <a:latin typeface="+mj-lt"/>
+            </a:endParaRPr>
+          </a:p>
+        </p:txBody>
+      </p:sp>
+      <p:sp>
+        <p:nvSpPr>
+          <p:cNvPr id="31" name="TextBox 30">
+            <a:extLst>
+              <a:ext uri="{FF2B5EF4-FFF2-40B4-BE49-F238E27FC236}">
+                <a16:creationId xmlns:a16="http://schemas.microsoft.com/office/drawing/2014/main" id="{1E02A35B-CDC0-081F-4389-A6AB755922B3}"/>
+              </a:ext>
+            </a:extLst>
+          </p:cNvPr>
+          <p:cNvSpPr txBox="1"/>
+          <p:nvPr/>
+        </p:nvSpPr>
+        <p:spPr>
+          <a:xfrm>
+            <a:off x="5719581" y="4060249"/>
+            <a:ext cx="382006" cy="261610"/>
+          </a:xfrm>
+          <a:prstGeom prst="rect">
+            <a:avLst/>
+          </a:prstGeom>
+          <a:noFill/>
+        </p:spPr>
+        <p:txBody>
+          <a:bodyPr wrap="square" rtlCol="0">
+            <a:spAutoFit/>
+          </a:bodyPr>
+          <a:lstStyle/>
+          <a:p>
+            <a:r>
+              <a:rPr lang="en-US" sz="1100" dirty="0">
+                <a:latin typeface="+mj-lt"/>
+              </a:rPr>
+              <a:t>2k</a:t>
+            </a:r>
+            <a:endParaRPr lang="en-US" sz="1050" dirty="0">
+              <a:latin typeface="+mj-lt"/>
+            </a:endParaRPr>
+          </a:p>
+        </p:txBody>
+      </p:sp>
+      <p:sp>
+        <p:nvSpPr>
+          <p:cNvPr id="32" name="TextBox 31">
+            <a:extLst>
+              <a:ext uri="{FF2B5EF4-FFF2-40B4-BE49-F238E27FC236}">
+                <a16:creationId xmlns:a16="http://schemas.microsoft.com/office/drawing/2014/main" id="{F5068E25-AC7A-8F6B-3150-3FDA506ED7A1}"/>
+              </a:ext>
+            </a:extLst>
+          </p:cNvPr>
+          <p:cNvSpPr txBox="1"/>
+          <p:nvPr/>
+        </p:nvSpPr>
+        <p:spPr>
+          <a:xfrm>
+            <a:off x="6388315" y="4053135"/>
+            <a:ext cx="332693" cy="261610"/>
+          </a:xfrm>
+          <a:prstGeom prst="rect">
+            <a:avLst/>
+          </a:prstGeom>
+          <a:noFill/>
+        </p:spPr>
+        <p:txBody>
+          <a:bodyPr wrap="square" rtlCol="0">
+            <a:spAutoFit/>
+          </a:bodyPr>
+          <a:lstStyle/>
+          <a:p>
+            <a:r>
+              <a:rPr lang="en-US" sz="1100" dirty="0">
+                <a:latin typeface="+mj-lt"/>
+              </a:rPr>
+              <a:t>4k</a:t>
+            </a:r>
+            <a:endParaRPr lang="en-US" sz="1050" dirty="0">
+              <a:latin typeface="+mj-lt"/>
+            </a:endParaRPr>
+          </a:p>
+        </p:txBody>
+      </p:sp>
+      <p:sp>
+        <p:nvSpPr>
+          <p:cNvPr id="33" name="TextBox 32">
+            <a:extLst>
+              <a:ext uri="{FF2B5EF4-FFF2-40B4-BE49-F238E27FC236}">
+                <a16:creationId xmlns:a16="http://schemas.microsoft.com/office/drawing/2014/main" id="{8F5F8CDF-964A-629D-43BC-CAE9AF3B0564}"/>
+              </a:ext>
+            </a:extLst>
+          </p:cNvPr>
+          <p:cNvSpPr txBox="1"/>
+          <p:nvPr/>
+        </p:nvSpPr>
+        <p:spPr>
+          <a:xfrm>
+            <a:off x="7048672" y="4041732"/>
+            <a:ext cx="332693" cy="261610"/>
+          </a:xfrm>
+          <a:prstGeom prst="rect">
+            <a:avLst/>
+          </a:prstGeom>
+          <a:noFill/>
+        </p:spPr>
+        <p:txBody>
+          <a:bodyPr wrap="square" rtlCol="0">
+            <a:spAutoFit/>
+          </a:bodyPr>
+          <a:lstStyle/>
+          <a:p>
+            <a:r>
+              <a:rPr lang="en-US" sz="1100" dirty="0">
+                <a:latin typeface="+mj-lt"/>
+              </a:rPr>
+              <a:t>8k</a:t>
+            </a:r>
+            <a:endParaRPr lang="en-US" sz="1050" dirty="0">
+              <a:latin typeface="+mj-lt"/>
+            </a:endParaRPr>
+          </a:p>
+        </p:txBody>
+      </p:sp>
+      <p:sp>
+        <p:nvSpPr>
+          <p:cNvPr id="34" name="TextBox 33">
+            <a:extLst>
+              <a:ext uri="{FF2B5EF4-FFF2-40B4-BE49-F238E27FC236}">
+                <a16:creationId xmlns:a16="http://schemas.microsoft.com/office/drawing/2014/main" id="{A77E979E-FE15-9C62-9A29-D7FC14187514}"/>
+              </a:ext>
+            </a:extLst>
+          </p:cNvPr>
+          <p:cNvSpPr txBox="1"/>
+          <p:nvPr/>
+        </p:nvSpPr>
+        <p:spPr>
+          <a:xfrm>
+            <a:off x="7629461" y="4041732"/>
+            <a:ext cx="433971" cy="261610"/>
+          </a:xfrm>
+          <a:prstGeom prst="rect">
+            <a:avLst/>
+          </a:prstGeom>
+          <a:noFill/>
+        </p:spPr>
+        <p:txBody>
+          <a:bodyPr wrap="square" rtlCol="0">
+            <a:spAutoFit/>
+          </a:bodyPr>
+          <a:lstStyle/>
+          <a:p>
+            <a:r>
+              <a:rPr lang="en-US" sz="1100" dirty="0">
+                <a:latin typeface="+mj-lt"/>
+              </a:rPr>
+              <a:t>16k</a:t>
+            </a:r>
+            <a:endParaRPr lang="en-US" sz="1050" dirty="0">
+              <a:latin typeface="+mj-lt"/>
+            </a:endParaRPr>
+          </a:p>
+        </p:txBody>
+      </p:sp>
+      <p:sp>
+        <p:nvSpPr>
+          <p:cNvPr id="18" name="Rectangle 17">
+            <a:extLst>
+              <a:ext uri="{FF2B5EF4-FFF2-40B4-BE49-F238E27FC236}">
+                <a16:creationId xmlns:a16="http://schemas.microsoft.com/office/drawing/2014/main" id="{03BAA99D-84EE-93A7-E5D0-14982EBDDE56}"/>
+              </a:ext>
+            </a:extLst>
+          </p:cNvPr>
+          <p:cNvSpPr/>
+          <p:nvPr/>
+        </p:nvSpPr>
+        <p:spPr>
+          <a:xfrm>
+            <a:off x="12192000" y="4589253"/>
+            <a:ext cx="914400" cy="914400"/>
+          </a:xfrm>
+          <a:prstGeom prst="rect">
+            <a:avLst/>
+          </a:prstGeom>
+        </p:spPr>
+        <p:style>
+          <a:lnRef idx="2">
+            <a:schemeClr val="accent1">
+              <a:shade val="15000"/>
+            </a:schemeClr>
+          </a:lnRef>
+          <a:fillRef idx="1">
+            <a:schemeClr val="accent1"/>
+          </a:fillRef>
+          <a:effectRef idx="0">
+            <a:schemeClr val="accent1"/>
+          </a:effectRef>
+          <a:fontRef idx="minor">
+            <a:schemeClr val="lt1"/>
+          </a:fontRef>
+        </p:style>
+        <p:txBody>
+          <a:bodyPr rtlCol="0" anchor="ctr"/>
+          <a:lstStyle/>
+          <a:p>
+            <a:pPr algn="ctr"/>
+            <a:endParaRPr lang="en-US"/>
+          </a:p>
+        </p:txBody>
+      </p:sp>
+      <p:sp>
+        <p:nvSpPr>
+          <p:cNvPr id="19" name="TextBox 18">
+            <a:extLst>
+              <a:ext uri="{FF2B5EF4-FFF2-40B4-BE49-F238E27FC236}">
+                <a16:creationId xmlns:a16="http://schemas.microsoft.com/office/drawing/2014/main" id="{9EC163EB-6A24-156D-1AEF-32E314BF12D5}"/>
+              </a:ext>
+            </a:extLst>
+          </p:cNvPr>
+          <p:cNvSpPr txBox="1"/>
+          <p:nvPr/>
+        </p:nvSpPr>
+        <p:spPr>
+          <a:xfrm>
+            <a:off x="5039419" y="4253209"/>
+            <a:ext cx="703911" cy="292388"/>
+          </a:xfrm>
+          <a:prstGeom prst="rect">
+            <a:avLst/>
+          </a:prstGeom>
+          <a:noFill/>
+        </p:spPr>
+        <p:txBody>
+          <a:bodyPr wrap="none" rtlCol="0">
+            <a:spAutoFit/>
+          </a:bodyPr>
+          <a:lstStyle/>
+          <a:p>
+            <a:r>
+              <a:rPr lang="en-US" sz="1300" dirty="0">
+                <a:latin typeface="+mj-lt"/>
+              </a:rPr>
+              <a:t>DPOAE</a:t>
+            </a:r>
           </a:p>
         </p:txBody>
       </p:sp>
@@ -5580,7 +6132,7 @@
                     <a:ea typeface="+mn-ea"/>
                     <a:cs typeface="+mn-cs"/>
                   </a:rPr>
-                  <a:t>Results: Swept OAE</a:t>
+                  <a:t>Results: Swept DPOAE</a:t>
                 </a:r>
                 <a:endParaRPr lang="en-US" b="1" dirty="0"/>
               </a:p>

</xml_diff>